<commit_message>
update with future plans
</commit_message>
<xml_diff>
--- a/slides/draft.pptx
+++ b/slides/draft.pptx
@@ -5,7 +5,7 @@
     <p:sldMasterId id="2147483648" r:id="rId1"/>
   </p:sldMasterIdLst>
   <p:notesMasterIdLst>
-    <p:notesMasterId r:id="rId20"/>
+    <p:notesMasterId r:id="rId22"/>
   </p:notesMasterIdLst>
   <p:sldIdLst>
     <p:sldId id="256" r:id="rId2"/>
@@ -26,6 +26,8 @@
     <p:sldId id="260" r:id="rId17"/>
     <p:sldId id="273" r:id="rId18"/>
     <p:sldId id="276" r:id="rId19"/>
+    <p:sldId id="277" r:id="rId20"/>
+    <p:sldId id="278" r:id="rId21"/>
   </p:sldIdLst>
   <p:sldSz cx="12192000" cy="6858000"/>
   <p:notesSz cx="6858000" cy="9144000"/>
@@ -1917,6 +1919,456 @@
     <p:extLst>
       <p:ext uri="{BB962C8B-B14F-4D97-AF65-F5344CB8AC3E}">
         <p14:creationId xmlns:p14="http://schemas.microsoft.com/office/powerpoint/2010/main" val="1532811307"/>
+      </p:ext>
+    </p:extLst>
+  </p:cSld>
+  <p:clrMapOvr>
+    <a:masterClrMapping/>
+  </p:clrMapOvr>
+</p:notes>
+</file>
+
+<file path=ppt/notesSlides/notesSlide8.xml><?xml version="1.0" encoding="utf-8"?>
+<p:notes xmlns:a="http://schemas.openxmlformats.org/drawingml/2006/main" xmlns:r="http://schemas.openxmlformats.org/officeDocument/2006/relationships" xmlns:p="http://schemas.openxmlformats.org/presentationml/2006/main">
+  <p:cSld>
+    <p:spTree>
+      <p:nvGrpSpPr>
+        <p:cNvPr id="1" name=""/>
+        <p:cNvGrpSpPr/>
+        <p:nvPr/>
+      </p:nvGrpSpPr>
+      <p:grpSpPr>
+        <a:xfrm>
+          <a:off x="0" y="0"/>
+          <a:ext cx="0" cy="0"/>
+          <a:chOff x="0" y="0"/>
+          <a:chExt cx="0" cy="0"/>
+        </a:xfrm>
+      </p:grpSpPr>
+      <p:sp>
+        <p:nvSpPr>
+          <p:cNvPr id="2" name="Folienbildplatzhalter 1"/>
+          <p:cNvSpPr>
+            <a:spLocks noGrp="1" noRot="1" noChangeAspect="1"/>
+          </p:cNvSpPr>
+          <p:nvPr>
+            <p:ph type="sldImg"/>
+          </p:nvPr>
+        </p:nvSpPr>
+        <p:spPr/>
+      </p:sp>
+      <p:sp>
+        <p:nvSpPr>
+          <p:cNvPr id="3" name="Notizenplatzhalter 2"/>
+          <p:cNvSpPr>
+            <a:spLocks noGrp="1"/>
+          </p:cNvSpPr>
+          <p:nvPr>
+            <p:ph type="body" idx="1"/>
+          </p:nvPr>
+        </p:nvSpPr>
+        <p:spPr/>
+        <p:txBody>
+          <a:bodyPr/>
+          <a:lstStyle/>
+          <a:p>
+            <a:pPr marL="0" marR="0" lvl="0" indent="0" algn="l" defTabSz="914400" rtl="0" eaLnBrk="1" fontAlgn="auto" latinLnBrk="0" hangingPunct="1">
+              <a:lnSpc>
+                <a:spcPct val="100000"/>
+              </a:lnSpc>
+              <a:spcBef>
+                <a:spcPts val="0"/>
+              </a:spcBef>
+              <a:spcAft>
+                <a:spcPts val="0"/>
+              </a:spcAft>
+              <a:buClrTx/>
+              <a:buSzTx/>
+              <a:buFontTx/>
+              <a:buNone/>
+              <a:tabLst/>
+              <a:defRPr/>
+            </a:pPr>
+            <a:r>
+              <a:rPr lang="de-DE" sz="1200" kern="1200" dirty="0">
+                <a:solidFill>
+                  <a:schemeClr val="tx1"/>
+                </a:solidFill>
+                <a:effectLst/>
+                <a:latin typeface="+mn-lt"/>
+                <a:ea typeface="+mn-ea"/>
+                <a:cs typeface="+mn-cs"/>
+              </a:rPr>
+              <a:t>0.212 kg </a:t>
+            </a:r>
+            <a:r>
+              <a:rPr lang="de-DE" sz="1200" kern="1200" dirty="0" err="1">
+                <a:solidFill>
+                  <a:schemeClr val="tx1"/>
+                </a:solidFill>
+                <a:effectLst/>
+                <a:latin typeface="+mn-lt"/>
+                <a:ea typeface="+mn-ea"/>
+                <a:cs typeface="+mn-cs"/>
+              </a:rPr>
+              <a:t>of</a:t>
+            </a:r>
+            <a:r>
+              <a:rPr lang="de-DE" sz="1200" kern="1200" dirty="0">
+                <a:solidFill>
+                  <a:schemeClr val="tx1"/>
+                </a:solidFill>
+                <a:effectLst/>
+                <a:latin typeface="+mn-lt"/>
+                <a:ea typeface="+mn-ea"/>
+                <a:cs typeface="+mn-cs"/>
+              </a:rPr>
+              <a:t> co2 per 1km </a:t>
+            </a:r>
+            <a:r>
+              <a:rPr lang="de-DE" sz="1200" kern="1200" dirty="0" err="1">
+                <a:solidFill>
+                  <a:schemeClr val="tx1"/>
+                </a:solidFill>
+                <a:effectLst/>
+                <a:latin typeface="+mn-lt"/>
+                <a:ea typeface="+mn-ea"/>
+                <a:cs typeface="+mn-cs"/>
+              </a:rPr>
+              <a:t>drive</a:t>
+            </a:r>
+            <a:endParaRPr lang="de-DE" sz="1200" kern="1200" dirty="0">
+              <a:solidFill>
+                <a:schemeClr val="tx1"/>
+              </a:solidFill>
+              <a:effectLst/>
+              <a:latin typeface="+mn-lt"/>
+              <a:ea typeface="+mn-ea"/>
+              <a:cs typeface="+mn-cs"/>
+            </a:endParaRPr>
+          </a:p>
+          <a:p>
+            <a:pPr marL="0" marR="0" lvl="0" indent="0" algn="l" defTabSz="914400" rtl="0" eaLnBrk="1" fontAlgn="auto" latinLnBrk="0" hangingPunct="1">
+              <a:lnSpc>
+                <a:spcPct val="100000"/>
+              </a:lnSpc>
+              <a:spcBef>
+                <a:spcPts val="0"/>
+              </a:spcBef>
+              <a:spcAft>
+                <a:spcPts val="0"/>
+              </a:spcAft>
+              <a:buClrTx/>
+              <a:buSzTx/>
+              <a:buFontTx/>
+              <a:buNone/>
+              <a:tabLst/>
+              <a:defRPr/>
+            </a:pPr>
+            <a:r>
+              <a:rPr lang="de-DE" sz="1200" kern="1200" dirty="0">
+                <a:solidFill>
+                  <a:schemeClr val="tx1"/>
+                </a:solidFill>
+                <a:effectLst/>
+                <a:latin typeface="+mn-lt"/>
+                <a:ea typeface="+mn-ea"/>
+                <a:cs typeface="+mn-cs"/>
+              </a:rPr>
+              <a:t>*2 </a:t>
+            </a:r>
+            <a:r>
+              <a:rPr lang="de-DE" sz="1200" kern="1200" dirty="0" err="1">
+                <a:solidFill>
+                  <a:schemeClr val="tx1"/>
+                </a:solidFill>
+                <a:effectLst/>
+                <a:latin typeface="+mn-lt"/>
+                <a:ea typeface="+mn-ea"/>
+                <a:cs typeface="+mn-cs"/>
+              </a:rPr>
+              <a:t>twice</a:t>
+            </a:r>
+            <a:r>
+              <a:rPr lang="de-DE" sz="1200" kern="1200" dirty="0">
+                <a:solidFill>
+                  <a:schemeClr val="tx1"/>
+                </a:solidFill>
+                <a:effectLst/>
+                <a:latin typeface="+mn-lt"/>
+                <a:ea typeface="+mn-ea"/>
+                <a:cs typeface="+mn-cs"/>
+              </a:rPr>
+              <a:t> a </a:t>
+            </a:r>
+            <a:r>
+              <a:rPr lang="de-DE" sz="1200" kern="1200" dirty="0" err="1">
+                <a:solidFill>
+                  <a:schemeClr val="tx1"/>
+                </a:solidFill>
+                <a:effectLst/>
+                <a:latin typeface="+mn-lt"/>
+                <a:ea typeface="+mn-ea"/>
+                <a:cs typeface="+mn-cs"/>
+              </a:rPr>
+              <a:t>day</a:t>
+            </a:r>
+            <a:endParaRPr lang="de-DE" sz="1200" kern="1200" dirty="0">
+              <a:solidFill>
+                <a:schemeClr val="tx1"/>
+              </a:solidFill>
+              <a:effectLst/>
+              <a:latin typeface="+mn-lt"/>
+              <a:ea typeface="+mn-ea"/>
+              <a:cs typeface="+mn-cs"/>
+            </a:endParaRPr>
+          </a:p>
+          <a:p>
+            <a:pPr marL="0" marR="0" lvl="0" indent="0" algn="l" defTabSz="914400" rtl="0" eaLnBrk="1" fontAlgn="auto" latinLnBrk="0" hangingPunct="1">
+              <a:lnSpc>
+                <a:spcPct val="100000"/>
+              </a:lnSpc>
+              <a:spcBef>
+                <a:spcPts val="0"/>
+              </a:spcBef>
+              <a:spcAft>
+                <a:spcPts val="0"/>
+              </a:spcAft>
+              <a:buClrTx/>
+              <a:buSzTx/>
+              <a:buFontTx/>
+              <a:buNone/>
+              <a:tabLst/>
+              <a:defRPr/>
+            </a:pPr>
+            <a:r>
+              <a:rPr lang="de-DE" sz="1200" kern="1200" dirty="0">
+                <a:solidFill>
+                  <a:schemeClr val="tx1"/>
+                </a:solidFill>
+                <a:effectLst/>
+                <a:latin typeface="+mn-lt"/>
+                <a:ea typeface="+mn-ea"/>
+                <a:cs typeface="+mn-cs"/>
+              </a:rPr>
+              <a:t>*200 </a:t>
+            </a:r>
+            <a:r>
+              <a:rPr lang="de-DE" sz="1200" kern="1200" dirty="0" err="1">
+                <a:solidFill>
+                  <a:schemeClr val="tx1"/>
+                </a:solidFill>
+                <a:effectLst/>
+                <a:latin typeface="+mn-lt"/>
+                <a:ea typeface="+mn-ea"/>
+                <a:cs typeface="+mn-cs"/>
+              </a:rPr>
+              <a:t>times</a:t>
+            </a:r>
+            <a:r>
+              <a:rPr lang="de-DE" sz="1200" kern="1200" dirty="0">
+                <a:solidFill>
+                  <a:schemeClr val="tx1"/>
+                </a:solidFill>
+                <a:effectLst/>
+                <a:latin typeface="+mn-lt"/>
+                <a:ea typeface="+mn-ea"/>
+                <a:cs typeface="+mn-cs"/>
+              </a:rPr>
+              <a:t> a </a:t>
+            </a:r>
+            <a:r>
+              <a:rPr lang="de-DE" sz="1200" kern="1200" dirty="0" err="1">
+                <a:solidFill>
+                  <a:schemeClr val="tx1"/>
+                </a:solidFill>
+                <a:effectLst/>
+                <a:latin typeface="+mn-lt"/>
+                <a:ea typeface="+mn-ea"/>
+                <a:cs typeface="+mn-cs"/>
+              </a:rPr>
+              <a:t>year</a:t>
+            </a:r>
+            <a:endParaRPr lang="de-DE" sz="1200" kern="1200" dirty="0">
+              <a:solidFill>
+                <a:schemeClr val="tx1"/>
+              </a:solidFill>
+              <a:effectLst/>
+              <a:latin typeface="+mn-lt"/>
+              <a:ea typeface="+mn-ea"/>
+              <a:cs typeface="+mn-cs"/>
+            </a:endParaRPr>
+          </a:p>
+          <a:p>
+            <a:pPr marL="0" marR="0" lvl="0" indent="0" algn="l" defTabSz="914400" rtl="0" eaLnBrk="1" fontAlgn="auto" latinLnBrk="0" hangingPunct="1">
+              <a:lnSpc>
+                <a:spcPct val="100000"/>
+              </a:lnSpc>
+              <a:spcBef>
+                <a:spcPts val="0"/>
+              </a:spcBef>
+              <a:spcAft>
+                <a:spcPts val="0"/>
+              </a:spcAft>
+              <a:buClrTx/>
+              <a:buSzTx/>
+              <a:buFontTx/>
+              <a:buNone/>
+              <a:tabLst/>
+              <a:defRPr/>
+            </a:pPr>
+            <a:r>
+              <a:rPr lang="de-DE" sz="1200" kern="1200" dirty="0">
+                <a:solidFill>
+                  <a:schemeClr val="tx1"/>
+                </a:solidFill>
+                <a:effectLst/>
+                <a:latin typeface="+mn-lt"/>
+                <a:ea typeface="+mn-ea"/>
+                <a:cs typeface="+mn-cs"/>
+              </a:rPr>
+              <a:t>*500000 </a:t>
+            </a:r>
+            <a:r>
+              <a:rPr lang="de-DE" sz="1200" kern="1200" dirty="0" err="1">
+                <a:solidFill>
+                  <a:schemeClr val="tx1"/>
+                </a:solidFill>
+                <a:effectLst/>
+                <a:latin typeface="+mn-lt"/>
+                <a:ea typeface="+mn-ea"/>
+                <a:cs typeface="+mn-cs"/>
+              </a:rPr>
+              <a:t>families</a:t>
+            </a:r>
+            <a:r>
+              <a:rPr lang="de-DE" sz="1200" kern="1200" dirty="0">
+                <a:solidFill>
+                  <a:schemeClr val="tx1"/>
+                </a:solidFill>
+                <a:effectLst/>
+                <a:latin typeface="+mn-lt"/>
+                <a:ea typeface="+mn-ea"/>
+                <a:cs typeface="+mn-cs"/>
+              </a:rPr>
+              <a:t> (20% </a:t>
+            </a:r>
+            <a:r>
+              <a:rPr lang="de-DE" sz="1200" kern="1200" dirty="0" err="1">
+                <a:solidFill>
+                  <a:schemeClr val="tx1"/>
+                </a:solidFill>
+                <a:effectLst/>
+                <a:latin typeface="+mn-lt"/>
+                <a:ea typeface="+mn-ea"/>
+                <a:cs typeface="+mn-cs"/>
+              </a:rPr>
+              <a:t>of</a:t>
+            </a:r>
+            <a:r>
+              <a:rPr lang="de-DE" sz="1200" kern="1200" dirty="0">
+                <a:solidFill>
+                  <a:schemeClr val="tx1"/>
+                </a:solidFill>
+                <a:effectLst/>
+                <a:latin typeface="+mn-lt"/>
+                <a:ea typeface="+mn-ea"/>
+                <a:cs typeface="+mn-cs"/>
+              </a:rPr>
+              <a:t> 2.8 MIO)</a:t>
+            </a:r>
+          </a:p>
+          <a:p>
+            <a:pPr marL="0" marR="0" lvl="0" indent="0" algn="l" defTabSz="914400" rtl="0" eaLnBrk="1" fontAlgn="auto" latinLnBrk="0" hangingPunct="1">
+              <a:lnSpc>
+                <a:spcPct val="100000"/>
+              </a:lnSpc>
+              <a:spcBef>
+                <a:spcPts val="0"/>
+              </a:spcBef>
+              <a:spcAft>
+                <a:spcPts val="0"/>
+              </a:spcAft>
+              <a:buClrTx/>
+              <a:buSzTx/>
+              <a:buFontTx/>
+              <a:buNone/>
+              <a:tabLst/>
+              <a:defRPr/>
+            </a:pPr>
+            <a:endParaRPr lang="de-DE" sz="1200" kern="1200" dirty="0">
+              <a:solidFill>
+                <a:schemeClr val="tx1"/>
+              </a:solidFill>
+              <a:effectLst/>
+              <a:latin typeface="+mn-lt"/>
+              <a:ea typeface="+mn-ea"/>
+              <a:cs typeface="+mn-cs"/>
+            </a:endParaRPr>
+          </a:p>
+          <a:p>
+            <a:pPr marL="0" marR="0" lvl="0" indent="0" algn="l" defTabSz="914400" rtl="0" eaLnBrk="1" fontAlgn="auto" latinLnBrk="0" hangingPunct="1">
+              <a:lnSpc>
+                <a:spcPct val="100000"/>
+              </a:lnSpc>
+              <a:spcBef>
+                <a:spcPts val="0"/>
+              </a:spcBef>
+              <a:spcAft>
+                <a:spcPts val="0"/>
+              </a:spcAft>
+              <a:buClrTx/>
+              <a:buSzTx/>
+              <a:buFontTx/>
+              <a:buNone/>
+              <a:tabLst/>
+              <a:defRPr/>
+            </a:pPr>
+            <a:r>
+              <a:rPr lang="de-DE" sz="1200" kern="1200" dirty="0">
+                <a:solidFill>
+                  <a:schemeClr val="tx1"/>
+                </a:solidFill>
+                <a:effectLst/>
+                <a:latin typeface="+mn-lt"/>
+                <a:ea typeface="+mn-ea"/>
+                <a:cs typeface="+mn-cs"/>
+              </a:rPr>
+              <a:t>5-6cent pro Kilometer</a:t>
+            </a:r>
+          </a:p>
+          <a:p>
+            <a:endParaRPr lang="de-DE" dirty="0"/>
+          </a:p>
+        </p:txBody>
+      </p:sp>
+      <p:sp>
+        <p:nvSpPr>
+          <p:cNvPr id="4" name="Foliennummernplatzhalter 3"/>
+          <p:cNvSpPr>
+            <a:spLocks noGrp="1"/>
+          </p:cNvSpPr>
+          <p:nvPr>
+            <p:ph type="sldNum" sz="quarter" idx="5"/>
+          </p:nvPr>
+        </p:nvSpPr>
+        <p:spPr/>
+        <p:txBody>
+          <a:bodyPr/>
+          <a:lstStyle/>
+          <a:p>
+            <a:fld id="{0088EFD8-5ED9-AD4B-A3FB-8A287AE11395}" type="slidenum">
+              <a:rPr lang="de-DE" smtClean="0"/>
+              <a:t>20</a:t>
+            </a:fld>
+            <a:endParaRPr lang="de-DE"/>
+          </a:p>
+        </p:txBody>
+      </p:sp>
+    </p:spTree>
+    <p:extLst>
+      <p:ext uri="{BB962C8B-B14F-4D97-AF65-F5344CB8AC3E}">
+        <p14:creationId xmlns:p14="http://schemas.microsoft.com/office/powerpoint/2010/main" val="1209782080"/>
       </p:ext>
     </p:extLst>
   </p:cSld>
@@ -8107,7 +8559,7 @@
         <p:spPr>
           <a:xfrm>
             <a:off x="288098" y="1637100"/>
-            <a:ext cx="11903902" cy="4154984"/>
+            <a:ext cx="11903902" cy="4832092"/>
           </a:xfrm>
           <a:prstGeom prst="rect">
             <a:avLst/>
@@ -8207,6 +8659,21 @@
                 <a:latin typeface="DIN Condensed" pitchFamily="2" charset="0"/>
               </a:rPr>
               <a:t>MONEY VIA GAMIFICATION AND ABO MODEL.</a:t>
+            </a:r>
+          </a:p>
+          <a:p>
+            <a:pPr marL="571500" indent="-571500">
+              <a:buFont typeface="Arial" panose="020B0604020202020204" pitchFamily="34" charset="0"/>
+              <a:buChar char="•"/>
+            </a:pPr>
+            <a:r>
+              <a:rPr lang="de-DE" sz="4400" dirty="0">
+                <a:solidFill>
+                  <a:schemeClr val="bg1"/>
+                </a:solidFill>
+                <a:latin typeface="DIN Condensed" pitchFamily="2" charset="0"/>
+              </a:rPr>
+              <a:t>NICE FUTURE PLANS.</a:t>
             </a:r>
           </a:p>
         </p:txBody>
@@ -8349,6 +8816,140 @@
     <p:extLst>
       <p:ext uri="{BB962C8B-B14F-4D97-AF65-F5344CB8AC3E}">
         <p14:creationId xmlns:p14="http://schemas.microsoft.com/office/powerpoint/2010/main" val="3196179730"/>
+      </p:ext>
+    </p:extLst>
+  </p:cSld>
+  <p:clrMapOvr>
+    <a:masterClrMapping/>
+  </p:clrMapOvr>
+</p:sld>
+</file>
+
+<file path=ppt/slides/slide19.xml><?xml version="1.0" encoding="utf-8"?>
+<p:sld xmlns:a="http://schemas.openxmlformats.org/drawingml/2006/main" xmlns:r="http://schemas.openxmlformats.org/officeDocument/2006/relationships" xmlns:p="http://schemas.openxmlformats.org/presentationml/2006/main">
+  <p:cSld>
+    <p:spTree>
+      <p:nvGrpSpPr>
+        <p:cNvPr id="1" name=""/>
+        <p:cNvGrpSpPr/>
+        <p:nvPr/>
+      </p:nvGrpSpPr>
+      <p:grpSpPr>
+        <a:xfrm>
+          <a:off x="0" y="0"/>
+          <a:ext cx="0" cy="0"/>
+          <a:chOff x="0" y="0"/>
+          <a:chExt cx="0" cy="0"/>
+        </a:xfrm>
+      </p:grpSpPr>
+      <p:sp>
+        <p:nvSpPr>
+          <p:cNvPr id="4" name="Rechteck 3">
+            <a:extLst>
+              <a:ext uri="{FF2B5EF4-FFF2-40B4-BE49-F238E27FC236}">
+                <a16:creationId xmlns:a16="http://schemas.microsoft.com/office/drawing/2014/main" id="{4DC97915-D3D7-AD4B-9337-E8319E17DDD9}"/>
+              </a:ext>
+            </a:extLst>
+          </p:cNvPr>
+          <p:cNvSpPr/>
+          <p:nvPr/>
+        </p:nvSpPr>
+        <p:spPr>
+          <a:xfrm>
+            <a:off x="0" y="0"/>
+            <a:ext cx="12192000" cy="6858000"/>
+          </a:xfrm>
+          <a:prstGeom prst="rect">
+            <a:avLst/>
+          </a:prstGeom>
+          <a:gradFill flip="none" rotWithShape="1">
+            <a:gsLst>
+              <a:gs pos="100000">
+                <a:srgbClr val="5EDCFF"/>
+              </a:gs>
+              <a:gs pos="12000">
+                <a:srgbClr val="4A9CE8"/>
+              </a:gs>
+            </a:gsLst>
+            <a:path path="circle">
+              <a:fillToRect t="100000" r="100000"/>
+            </a:path>
+            <a:tileRect l="-100000" b="-100000"/>
+          </a:gradFill>
+          <a:ln>
+            <a:noFill/>
+          </a:ln>
+        </p:spPr>
+        <p:style>
+          <a:lnRef idx="2">
+            <a:schemeClr val="accent1">
+              <a:shade val="50000"/>
+            </a:schemeClr>
+          </a:lnRef>
+          <a:fillRef idx="1">
+            <a:schemeClr val="accent1"/>
+          </a:fillRef>
+          <a:effectRef idx="0">
+            <a:schemeClr val="accent1"/>
+          </a:effectRef>
+          <a:fontRef idx="minor">
+            <a:schemeClr val="lt1"/>
+          </a:fontRef>
+        </p:style>
+        <p:txBody>
+          <a:bodyPr rtlCol="0" anchor="ctr"/>
+          <a:lstStyle/>
+          <a:p>
+            <a:pPr algn="ctr"/>
+            <a:endParaRPr lang="de-DE"/>
+          </a:p>
+        </p:txBody>
+      </p:sp>
+      <p:sp>
+        <p:nvSpPr>
+          <p:cNvPr id="5" name="Textfeld 4">
+            <a:extLst>
+              <a:ext uri="{FF2B5EF4-FFF2-40B4-BE49-F238E27FC236}">
+                <a16:creationId xmlns:a16="http://schemas.microsoft.com/office/drawing/2014/main" id="{D172A450-7243-3241-8338-6594A435549B}"/>
+              </a:ext>
+            </a:extLst>
+          </p:cNvPr>
+          <p:cNvSpPr txBox="1"/>
+          <p:nvPr/>
+        </p:nvSpPr>
+        <p:spPr>
+          <a:xfrm>
+            <a:off x="2745287" y="2644170"/>
+            <a:ext cx="6701425" cy="1569660"/>
+          </a:xfrm>
+          <a:prstGeom prst="rect">
+            <a:avLst/>
+          </a:prstGeom>
+          <a:noFill/>
+        </p:spPr>
+        <p:txBody>
+          <a:bodyPr wrap="square" rtlCol="0">
+            <a:spAutoFit/>
+          </a:bodyPr>
+          <a:lstStyle/>
+          <a:p>
+            <a:pPr algn="ctr"/>
+            <a:r>
+              <a:rPr lang="de-DE" sz="9600" b="1" dirty="0">
+                <a:solidFill>
+                  <a:schemeClr val="bg1"/>
+                </a:solidFill>
+                <a:latin typeface="DIN Condensed" pitchFamily="2" charset="0"/>
+              </a:rPr>
+              <a:t>BOOOOOM.</a:t>
+            </a:r>
+          </a:p>
+        </p:txBody>
+      </p:sp>
+    </p:spTree>
+    <p:extLst>
+      <p:ext uri="{BB962C8B-B14F-4D97-AF65-F5344CB8AC3E}">
+        <p14:creationId xmlns:p14="http://schemas.microsoft.com/office/powerpoint/2010/main" val="2199140047"/>
       </p:ext>
     </p:extLst>
   </p:cSld>
@@ -8660,7 +9261,7 @@
                   </a:solidFill>
                   <a:latin typeface="DIN Condensed" pitchFamily="2" charset="0"/>
                 </a:rPr>
-                <a:t>BENNI</a:t>
+                <a:t>BENNY</a:t>
               </a:r>
             </a:p>
           </p:txBody>
@@ -9319,6 +9920,384 @@
       <p:bldP spid="19" grpId="0"/>
     </p:bldLst>
   </p:timing>
+</p:sld>
+</file>
+
+<file path=ppt/slides/slide20.xml><?xml version="1.0" encoding="utf-8"?>
+<p:sld xmlns:a="http://schemas.openxmlformats.org/drawingml/2006/main" xmlns:r="http://schemas.openxmlformats.org/officeDocument/2006/relationships" xmlns:p="http://schemas.openxmlformats.org/presentationml/2006/main">
+  <p:cSld>
+    <p:spTree>
+      <p:nvGrpSpPr>
+        <p:cNvPr id="1" name=""/>
+        <p:cNvGrpSpPr/>
+        <p:nvPr/>
+      </p:nvGrpSpPr>
+      <p:grpSpPr>
+        <a:xfrm>
+          <a:off x="0" y="0"/>
+          <a:ext cx="0" cy="0"/>
+          <a:chOff x="0" y="0"/>
+          <a:chExt cx="0" cy="0"/>
+        </a:xfrm>
+      </p:grpSpPr>
+      <p:sp>
+        <p:nvSpPr>
+          <p:cNvPr id="4" name="Rechteck 3">
+            <a:extLst>
+              <a:ext uri="{FF2B5EF4-FFF2-40B4-BE49-F238E27FC236}">
+                <a16:creationId xmlns:a16="http://schemas.microsoft.com/office/drawing/2014/main" id="{4DC97915-D3D7-AD4B-9337-E8319E17DDD9}"/>
+              </a:ext>
+            </a:extLst>
+          </p:cNvPr>
+          <p:cNvSpPr/>
+          <p:nvPr/>
+        </p:nvSpPr>
+        <p:spPr>
+          <a:xfrm>
+            <a:off x="0" y="0"/>
+            <a:ext cx="12192000" cy="6858000"/>
+          </a:xfrm>
+          <a:prstGeom prst="rect">
+            <a:avLst/>
+          </a:prstGeom>
+          <a:gradFill flip="none" rotWithShape="1">
+            <a:gsLst>
+              <a:gs pos="100000">
+                <a:srgbClr val="5EDCFF"/>
+              </a:gs>
+              <a:gs pos="12000">
+                <a:srgbClr val="4A9CE8"/>
+              </a:gs>
+            </a:gsLst>
+            <a:path path="circle">
+              <a:fillToRect t="100000" r="100000"/>
+            </a:path>
+            <a:tileRect l="-100000" b="-100000"/>
+          </a:gradFill>
+          <a:ln>
+            <a:noFill/>
+          </a:ln>
+        </p:spPr>
+        <p:style>
+          <a:lnRef idx="2">
+            <a:schemeClr val="accent1">
+              <a:shade val="50000"/>
+            </a:schemeClr>
+          </a:lnRef>
+          <a:fillRef idx="1">
+            <a:schemeClr val="accent1"/>
+          </a:fillRef>
+          <a:effectRef idx="0">
+            <a:schemeClr val="accent1"/>
+          </a:effectRef>
+          <a:fontRef idx="minor">
+            <a:schemeClr val="lt1"/>
+          </a:fontRef>
+        </p:style>
+        <p:txBody>
+          <a:bodyPr rtlCol="0" anchor="ctr"/>
+          <a:lstStyle/>
+          <a:p>
+            <a:pPr algn="ctr"/>
+            <a:endParaRPr lang="de-DE"/>
+          </a:p>
+        </p:txBody>
+      </p:sp>
+      <p:pic>
+        <p:nvPicPr>
+          <p:cNvPr id="9" name="Grafik 8">
+            <a:extLst>
+              <a:ext uri="{FF2B5EF4-FFF2-40B4-BE49-F238E27FC236}">
+                <a16:creationId xmlns:a16="http://schemas.microsoft.com/office/drawing/2014/main" id="{AB095246-CE2B-4E42-A87D-FD9A86FEBE80}"/>
+              </a:ext>
+            </a:extLst>
+          </p:cNvPr>
+          <p:cNvPicPr>
+            <a:picLocks noChangeAspect="1"/>
+          </p:cNvPicPr>
+          <p:nvPr/>
+        </p:nvPicPr>
+        <p:blipFill>
+          <a:blip r:embed="rId3"/>
+          <a:stretch>
+            <a:fillRect/>
+          </a:stretch>
+        </p:blipFill>
+        <p:spPr>
+          <a:xfrm>
+            <a:off x="141337" y="240270"/>
+            <a:ext cx="1224000" cy="1224000"/>
+          </a:xfrm>
+          <a:prstGeom prst="rect">
+            <a:avLst/>
+          </a:prstGeom>
+        </p:spPr>
+      </p:pic>
+      <p:sp>
+        <p:nvSpPr>
+          <p:cNvPr id="10" name="Textfeld 9">
+            <a:extLst>
+              <a:ext uri="{FF2B5EF4-FFF2-40B4-BE49-F238E27FC236}">
+                <a16:creationId xmlns:a16="http://schemas.microsoft.com/office/drawing/2014/main" id="{89C52750-940F-9A41-A756-9DA1300186EE}"/>
+              </a:ext>
+            </a:extLst>
+          </p:cNvPr>
+          <p:cNvSpPr txBox="1"/>
+          <p:nvPr/>
+        </p:nvSpPr>
+        <p:spPr>
+          <a:xfrm>
+            <a:off x="1506674" y="67440"/>
+            <a:ext cx="8854654" cy="1569660"/>
+          </a:xfrm>
+          <a:prstGeom prst="rect">
+            <a:avLst/>
+          </a:prstGeom>
+          <a:noFill/>
+        </p:spPr>
+        <p:txBody>
+          <a:bodyPr wrap="square" rtlCol="0">
+            <a:spAutoFit/>
+          </a:bodyPr>
+          <a:lstStyle/>
+          <a:p>
+            <a:r>
+              <a:rPr lang="de-DE" sz="9600" b="1" dirty="0">
+                <a:solidFill>
+                  <a:schemeClr val="bg1"/>
+                </a:solidFill>
+                <a:latin typeface="DIN Condensed" pitchFamily="2" charset="0"/>
+              </a:rPr>
+              <a:t>FUTURE PLANS</a:t>
+            </a:r>
+          </a:p>
+        </p:txBody>
+      </p:sp>
+      <p:sp>
+        <p:nvSpPr>
+          <p:cNvPr id="2" name="Textfeld 1">
+            <a:extLst>
+              <a:ext uri="{FF2B5EF4-FFF2-40B4-BE49-F238E27FC236}">
+                <a16:creationId xmlns:a16="http://schemas.microsoft.com/office/drawing/2014/main" id="{839E9D07-48CB-6042-9A97-50DD4AC9B313}"/>
+              </a:ext>
+            </a:extLst>
+          </p:cNvPr>
+          <p:cNvSpPr txBox="1"/>
+          <p:nvPr/>
+        </p:nvSpPr>
+        <p:spPr>
+          <a:xfrm>
+            <a:off x="288098" y="1637100"/>
+            <a:ext cx="11903902" cy="4154984"/>
+          </a:xfrm>
+          <a:prstGeom prst="rect">
+            <a:avLst/>
+          </a:prstGeom>
+          <a:noFill/>
+        </p:spPr>
+        <p:txBody>
+          <a:bodyPr wrap="square" rtlCol="0">
+            <a:spAutoFit/>
+          </a:bodyPr>
+          <a:lstStyle/>
+          <a:p>
+            <a:pPr marL="571500" indent="-571500">
+              <a:buFont typeface="Arial" panose="020B0604020202020204" pitchFamily="34" charset="0"/>
+              <a:buChar char="•"/>
+            </a:pPr>
+            <a:r>
+              <a:rPr lang="de-DE" sz="4400" dirty="0">
+                <a:solidFill>
+                  <a:schemeClr val="bg1"/>
+                </a:solidFill>
+                <a:latin typeface="DIN Condensed" pitchFamily="2" charset="0"/>
+              </a:rPr>
+              <a:t>Bus</a:t>
+            </a:r>
+          </a:p>
+          <a:p>
+            <a:pPr marL="571500" indent="-571500">
+              <a:buFont typeface="Arial" panose="020B0604020202020204" pitchFamily="34" charset="0"/>
+              <a:buChar char="•"/>
+            </a:pPr>
+            <a:r>
+              <a:rPr lang="de-DE" sz="4400" dirty="0" err="1">
+                <a:solidFill>
+                  <a:schemeClr val="bg1"/>
+                </a:solidFill>
+                <a:latin typeface="DIN Condensed" pitchFamily="2" charset="0"/>
+              </a:rPr>
+              <a:t>Wristband</a:t>
+            </a:r>
+            <a:endParaRPr lang="de-DE" sz="4400" dirty="0">
+              <a:solidFill>
+                <a:schemeClr val="bg1"/>
+              </a:solidFill>
+              <a:latin typeface="DIN Condensed" pitchFamily="2" charset="0"/>
+            </a:endParaRPr>
+          </a:p>
+          <a:p>
+            <a:pPr marL="571500" indent="-571500">
+              <a:buFont typeface="Arial" panose="020B0604020202020204" pitchFamily="34" charset="0"/>
+              <a:buChar char="•"/>
+            </a:pPr>
+            <a:r>
+              <a:rPr lang="de-DE" sz="4400" dirty="0">
+                <a:solidFill>
+                  <a:schemeClr val="bg1"/>
+                </a:solidFill>
+                <a:latin typeface="DIN Condensed" pitchFamily="2" charset="0"/>
+              </a:rPr>
+              <a:t>Parental </a:t>
+            </a:r>
+            <a:r>
+              <a:rPr lang="de-DE" sz="4400" dirty="0" err="1">
+                <a:solidFill>
+                  <a:schemeClr val="bg1"/>
+                </a:solidFill>
+                <a:latin typeface="DIN Condensed" pitchFamily="2" charset="0"/>
+              </a:rPr>
+              <a:t>thingy</a:t>
+            </a:r>
+            <a:endParaRPr lang="de-DE" sz="4400" dirty="0">
+              <a:solidFill>
+                <a:schemeClr val="bg1"/>
+              </a:solidFill>
+              <a:latin typeface="DIN Condensed" pitchFamily="2" charset="0"/>
+            </a:endParaRPr>
+          </a:p>
+          <a:p>
+            <a:pPr marL="571500" indent="-571500">
+              <a:buFont typeface="Arial" panose="020B0604020202020204" pitchFamily="34" charset="0"/>
+              <a:buChar char="•"/>
+            </a:pPr>
+            <a:r>
+              <a:rPr lang="de-DE" sz="4400" dirty="0">
+                <a:solidFill>
+                  <a:schemeClr val="bg1"/>
+                </a:solidFill>
+                <a:latin typeface="DIN Condensed" pitchFamily="2" charset="0"/>
+              </a:rPr>
+              <a:t>Tracking</a:t>
+            </a:r>
+          </a:p>
+          <a:p>
+            <a:pPr marL="571500" indent="-571500">
+              <a:buFont typeface="Arial" panose="020B0604020202020204" pitchFamily="34" charset="0"/>
+              <a:buChar char="•"/>
+            </a:pPr>
+            <a:r>
+              <a:rPr lang="de-DE" sz="4400" dirty="0">
+                <a:solidFill>
+                  <a:schemeClr val="bg1"/>
+                </a:solidFill>
+                <a:latin typeface="DIN Condensed" pitchFamily="2" charset="0"/>
+              </a:rPr>
+              <a:t>More </a:t>
+            </a:r>
+            <a:r>
+              <a:rPr lang="de-DE" sz="4400" dirty="0" err="1">
+                <a:solidFill>
+                  <a:schemeClr val="bg1"/>
+                </a:solidFill>
+                <a:latin typeface="DIN Condensed" pitchFamily="2" charset="0"/>
+              </a:rPr>
+              <a:t>gamification</a:t>
+            </a:r>
+            <a:endParaRPr lang="de-DE" sz="4400" dirty="0">
+              <a:solidFill>
+                <a:schemeClr val="bg1"/>
+              </a:solidFill>
+              <a:latin typeface="DIN Condensed" pitchFamily="2" charset="0"/>
+            </a:endParaRPr>
+          </a:p>
+          <a:p>
+            <a:pPr marL="571500" indent="-571500">
+              <a:buFont typeface="Arial" panose="020B0604020202020204" pitchFamily="34" charset="0"/>
+              <a:buChar char="•"/>
+            </a:pPr>
+            <a:r>
+              <a:rPr lang="de-DE" sz="4400" dirty="0" err="1">
+                <a:solidFill>
+                  <a:schemeClr val="bg1"/>
+                </a:solidFill>
+                <a:latin typeface="DIN Condensed" pitchFamily="2" charset="0"/>
+              </a:rPr>
+              <a:t>Learn</a:t>
+            </a:r>
+            <a:r>
+              <a:rPr lang="de-DE" sz="4400" dirty="0">
+                <a:solidFill>
+                  <a:schemeClr val="bg1"/>
+                </a:solidFill>
+                <a:latin typeface="DIN Condensed" pitchFamily="2" charset="0"/>
+              </a:rPr>
+              <a:t> </a:t>
+            </a:r>
+            <a:r>
+              <a:rPr lang="de-DE" sz="4400" dirty="0" err="1">
+                <a:solidFill>
+                  <a:schemeClr val="bg1"/>
+                </a:solidFill>
+                <a:latin typeface="DIN Condensed" pitchFamily="2" charset="0"/>
+              </a:rPr>
+              <a:t>traffic</a:t>
+            </a:r>
+            <a:r>
+              <a:rPr lang="de-DE" sz="4400" dirty="0">
+                <a:solidFill>
+                  <a:schemeClr val="bg1"/>
+                </a:solidFill>
+                <a:latin typeface="DIN Condensed" pitchFamily="2" charset="0"/>
+              </a:rPr>
+              <a:t> </a:t>
+            </a:r>
+            <a:r>
+              <a:rPr lang="de-DE" sz="4400" dirty="0" err="1">
+                <a:solidFill>
+                  <a:schemeClr val="bg1"/>
+                </a:solidFill>
+                <a:latin typeface="DIN Condensed" pitchFamily="2" charset="0"/>
+              </a:rPr>
+              <a:t>sign</a:t>
+            </a:r>
+            <a:r>
+              <a:rPr lang="de-DE" sz="4400" dirty="0">
+                <a:solidFill>
+                  <a:schemeClr val="bg1"/>
+                </a:solidFill>
+                <a:latin typeface="DIN Condensed" pitchFamily="2" charset="0"/>
+              </a:rPr>
+              <a:t> </a:t>
+            </a:r>
+            <a:r>
+              <a:rPr lang="de-DE" sz="4400" dirty="0" err="1">
+                <a:solidFill>
+                  <a:schemeClr val="bg1"/>
+                </a:solidFill>
+                <a:latin typeface="DIN Condensed" pitchFamily="2" charset="0"/>
+              </a:rPr>
+              <a:t>stuff</a:t>
+            </a:r>
+            <a:endParaRPr lang="de-DE" sz="4400" dirty="0">
+              <a:solidFill>
+                <a:schemeClr val="bg1"/>
+              </a:solidFill>
+              <a:latin typeface="DIN Condensed" pitchFamily="2" charset="0"/>
+            </a:endParaRPr>
+          </a:p>
+        </p:txBody>
+      </p:sp>
+    </p:spTree>
+    <p:extLst>
+      <p:ext uri="{BB962C8B-B14F-4D97-AF65-F5344CB8AC3E}">
+        <p14:creationId xmlns:p14="http://schemas.microsoft.com/office/powerpoint/2010/main" val="3608187931"/>
+      </p:ext>
+    </p:extLst>
+  </p:cSld>
+  <p:clrMapOvr>
+    <a:masterClrMapping/>
+  </p:clrMapOvr>
 </p:sld>
 </file>
 

</xml_diff>